<commit_message>
Completes intro page on the PPT
</commit_message>
<xml_diff>
--- a/presentation.pptx
+++ b/presentation.pptx
@@ -3396,6 +3396,10 @@
           <a:bodyPr/>
           <a:lstStyle/>
           <a:p>
+            <a:r>
+              <a:rPr lang="fr-FR" dirty="0" smtClean="0"/>
+              <a:t>système D’exploitation avancé</a:t>
+            </a:r>
             <a:endParaRPr lang="fr-FR" dirty="0"/>
           </a:p>
         </p:txBody>
@@ -3410,12 +3414,92 @@
             <p:ph type="subTitle" idx="1"/>
           </p:nvPr>
         </p:nvSpPr>
-        <p:spPr/>
-        <p:txBody>
-          <a:bodyPr/>
-          <a:lstStyle/>
-          <a:p>
-            <a:endParaRPr lang="fr-FR"/>
+        <p:spPr>
+          <a:xfrm>
+            <a:off x="685800" y="4057277"/>
+            <a:ext cx="6400800" cy="1752600"/>
+          </a:xfrm>
+        </p:spPr>
+        <p:txBody>
+          <a:bodyPr>
+            <a:normAutofit fontScale="55000" lnSpcReduction="20000"/>
+          </a:bodyPr>
+          <a:lstStyle/>
+          <a:p>
+            <a:r>
+              <a:rPr lang="fr-FR" sz="3600" b="1" dirty="0" smtClean="0"/>
+              <a:t>H4404</a:t>
+            </a:r>
+            <a:r>
+              <a:rPr lang="fr-FR" b="1" dirty="0" smtClean="0"/>
+              <a:t/>
+            </a:r>
+            <a:br>
+              <a:rPr lang="fr-FR" b="1" dirty="0" smtClean="0"/>
+            </a:br>
+            <a:endParaRPr lang="fr-FR" b="1" dirty="0" smtClean="0"/>
+          </a:p>
+          <a:p>
+            <a:r>
+              <a:rPr lang="fr-FR" dirty="0" smtClean="0"/>
+              <a:t>Guillaume ABADIE</a:t>
+            </a:r>
+          </a:p>
+          <a:p>
+            <a:r>
+              <a:rPr lang="fr-FR" dirty="0" smtClean="0"/>
+              <a:t>Nicolas BUISSON</a:t>
+            </a:r>
+          </a:p>
+          <a:p>
+            <a:r>
+              <a:rPr lang="fr-FR" dirty="0" smtClean="0"/>
+              <a:t>Louise </a:t>
+            </a:r>
+            <a:r>
+              <a:rPr lang="fr-FR" dirty="0" err="1" smtClean="0"/>
+              <a:t>CR</a:t>
+            </a:r>
+            <a:r>
+              <a:rPr lang="fr-FR" cap="all" spc="-100" dirty="0" err="1" smtClean="0">
+                <a:ea typeface="+mj-ea"/>
+                <a:cs typeface="+mj-cs"/>
+              </a:rPr>
+              <a:t>éPET</a:t>
+            </a:r>
+            <a:endParaRPr lang="fr-FR" cap="all" spc="-100" dirty="0" smtClean="0">
+              <a:ea typeface="+mj-ea"/>
+              <a:cs typeface="+mj-cs"/>
+            </a:endParaRPr>
+          </a:p>
+          <a:p>
+            <a:r>
+              <a:rPr lang="fr-FR" dirty="0"/>
+              <a:t>Rémi</a:t>
+            </a:r>
+            <a:r>
+              <a:rPr lang="fr-FR" cap="all" spc="-100" dirty="0" smtClean="0">
+                <a:ea typeface="+mj-ea"/>
+                <a:cs typeface="+mj-cs"/>
+              </a:rPr>
+              <a:t> DOMINGUES</a:t>
+            </a:r>
+          </a:p>
+          <a:p>
+            <a:r>
+              <a:rPr lang="fr-FR" dirty="0" smtClean="0"/>
+              <a:t>Aline MARTIN</a:t>
+            </a:r>
+          </a:p>
+          <a:p>
+            <a:r>
+              <a:rPr lang="fr-FR" dirty="0" smtClean="0"/>
+              <a:t>Martin WETTERWALD</a:t>
+            </a:r>
+            <a:endParaRPr lang="fr-FR" cap="all" spc="-100" dirty="0" smtClean="0">
+              <a:ea typeface="+mj-ea"/>
+              <a:cs typeface="+mj-cs"/>
+            </a:endParaRPr>
           </a:p>
         </p:txBody>
       </p:sp>

</xml_diff>

<commit_message>
Adds 3 sildes on the operating system
</commit_message>
<xml_diff>
--- a/presentation.pptx
+++ b/presentation.pptx
@@ -6,8 +6,11 @@
   </p:sldMasterIdLst>
   <p:sldIdLst>
     <p:sldId id="257" r:id="rId2"/>
-    <p:sldId id="258" r:id="rId3"/>
-    <p:sldId id="259" r:id="rId4"/>
+    <p:sldId id="262" r:id="rId3"/>
+    <p:sldId id="261" r:id="rId4"/>
+    <p:sldId id="260" r:id="rId5"/>
+    <p:sldId id="258" r:id="rId6"/>
+    <p:sldId id="259" r:id="rId7"/>
   </p:sldIdLst>
   <p:sldSz cx="9144000" cy="6858000" type="screen4x3"/>
   <p:notesSz cx="6858000" cy="9144000"/>
@@ -297,7 +300,7 @@
           <a:p>
             <a:fld id="{02B29D59-80A7-42AB-BA98-B46C05CBCD2D}" type="datetimeFigureOut">
               <a:rPr lang="fr-FR" smtClean="0"/>
-              <a:t>11/11/2013</a:t>
+              <a:t>12/11/13</a:t>
             </a:fld>
             <a:endParaRPr lang="fr-FR"/>
           </a:p>
@@ -339,7 +342,7 @@
           <a:p>
             <a:fld id="{F02C3570-90AD-431D-9871-FE88EA036DFC}" type="slidenum">
               <a:rPr lang="fr-FR" smtClean="0"/>
-              <a:t>‹N°›</a:t>
+              <a:t>‹#›</a:t>
             </a:fld>
             <a:endParaRPr lang="fr-FR"/>
           </a:p>
@@ -497,7 +500,7 @@
           <a:p>
             <a:fld id="{02B29D59-80A7-42AB-BA98-B46C05CBCD2D}" type="datetimeFigureOut">
               <a:rPr lang="fr-FR" smtClean="0"/>
-              <a:t>11/11/2013</a:t>
+              <a:t>12/11/13</a:t>
             </a:fld>
             <a:endParaRPr lang="fr-FR"/>
           </a:p>
@@ -539,7 +542,7 @@
           <a:p>
             <a:fld id="{F02C3570-90AD-431D-9871-FE88EA036DFC}" type="slidenum">
               <a:rPr lang="fr-FR" smtClean="0"/>
-              <a:t>‹N°›</a:t>
+              <a:t>‹#›</a:t>
             </a:fld>
             <a:endParaRPr lang="fr-FR"/>
           </a:p>
@@ -672,7 +675,7 @@
           <a:p>
             <a:fld id="{02B29D59-80A7-42AB-BA98-B46C05CBCD2D}" type="datetimeFigureOut">
               <a:rPr lang="fr-FR" smtClean="0"/>
-              <a:t>11/11/2013</a:t>
+              <a:t>12/11/13</a:t>
             </a:fld>
             <a:endParaRPr lang="fr-FR"/>
           </a:p>
@@ -714,7 +717,7 @@
           <a:p>
             <a:fld id="{F02C3570-90AD-431D-9871-FE88EA036DFC}" type="slidenum">
               <a:rPr lang="fr-FR" smtClean="0"/>
-              <a:t>‹N°›</a:t>
+              <a:t>‹#›</a:t>
             </a:fld>
             <a:endParaRPr lang="fr-FR"/>
           </a:p>
@@ -837,7 +840,7 @@
           <a:p>
             <a:fld id="{02B29D59-80A7-42AB-BA98-B46C05CBCD2D}" type="datetimeFigureOut">
               <a:rPr lang="fr-FR" smtClean="0"/>
-              <a:t>11/11/2013</a:t>
+              <a:t>12/11/13</a:t>
             </a:fld>
             <a:endParaRPr lang="fr-FR"/>
           </a:p>
@@ -879,7 +882,7 @@
           <a:p>
             <a:fld id="{F02C3570-90AD-431D-9871-FE88EA036DFC}" type="slidenum">
               <a:rPr lang="fr-FR" smtClean="0"/>
-              <a:t>‹N°›</a:t>
+              <a:t>‹#›</a:t>
             </a:fld>
             <a:endParaRPr lang="fr-FR"/>
           </a:p>
@@ -1085,7 +1088,7 @@
           <a:p>
             <a:fld id="{02B29D59-80A7-42AB-BA98-B46C05CBCD2D}" type="datetimeFigureOut">
               <a:rPr lang="fr-FR" smtClean="0"/>
-              <a:t>11/11/2013</a:t>
+              <a:t>12/11/13</a:t>
             </a:fld>
             <a:endParaRPr lang="fr-FR"/>
           </a:p>
@@ -1127,7 +1130,7 @@
           <a:p>
             <a:fld id="{F02C3570-90AD-431D-9871-FE88EA036DFC}" type="slidenum">
               <a:rPr lang="fr-FR" smtClean="0"/>
-              <a:t>‹N°›</a:t>
+              <a:t>‹#›</a:t>
             </a:fld>
             <a:endParaRPr lang="fr-FR"/>
           </a:p>
@@ -1403,7 +1406,7 @@
           <a:p>
             <a:fld id="{02B29D59-80A7-42AB-BA98-B46C05CBCD2D}" type="datetimeFigureOut">
               <a:rPr lang="fr-FR" smtClean="0"/>
-              <a:t>11/11/2013</a:t>
+              <a:t>12/11/13</a:t>
             </a:fld>
             <a:endParaRPr lang="fr-FR"/>
           </a:p>
@@ -1445,7 +1448,7 @@
           <a:p>
             <a:fld id="{F02C3570-90AD-431D-9871-FE88EA036DFC}" type="slidenum">
               <a:rPr lang="fr-FR" smtClean="0"/>
-              <a:t>‹N°›</a:t>
+              <a:t>‹#›</a:t>
             </a:fld>
             <a:endParaRPr lang="fr-FR"/>
           </a:p>
@@ -1869,7 +1872,7 @@
           <a:p>
             <a:fld id="{02B29D59-80A7-42AB-BA98-B46C05CBCD2D}" type="datetimeFigureOut">
               <a:rPr lang="fr-FR" smtClean="0"/>
-              <a:t>11/11/2013</a:t>
+              <a:t>12/11/13</a:t>
             </a:fld>
             <a:endParaRPr lang="fr-FR"/>
           </a:p>
@@ -1911,7 +1914,7 @@
           <a:p>
             <a:fld id="{F02C3570-90AD-431D-9871-FE88EA036DFC}" type="slidenum">
               <a:rPr lang="fr-FR" smtClean="0"/>
-              <a:t>‹N°›</a:t>
+              <a:t>‹#›</a:t>
             </a:fld>
             <a:endParaRPr lang="fr-FR"/>
           </a:p>
@@ -2017,7 +2020,7 @@
           <a:p>
             <a:fld id="{02B29D59-80A7-42AB-BA98-B46C05CBCD2D}" type="datetimeFigureOut">
               <a:rPr lang="fr-FR" smtClean="0"/>
-              <a:t>11/11/2013</a:t>
+              <a:t>12/11/13</a:t>
             </a:fld>
             <a:endParaRPr lang="fr-FR"/>
           </a:p>
@@ -2059,7 +2062,7 @@
           <a:p>
             <a:fld id="{F02C3570-90AD-431D-9871-FE88EA036DFC}" type="slidenum">
               <a:rPr lang="fr-FR" smtClean="0"/>
-              <a:t>‹N°›</a:t>
+              <a:t>‹#›</a:t>
             </a:fld>
             <a:endParaRPr lang="fr-FR"/>
           </a:p>
@@ -2107,7 +2110,7 @@
           <a:p>
             <a:fld id="{02B29D59-80A7-42AB-BA98-B46C05CBCD2D}" type="datetimeFigureOut">
               <a:rPr lang="fr-FR" smtClean="0"/>
-              <a:t>11/11/2013</a:t>
+              <a:t>12/11/13</a:t>
             </a:fld>
             <a:endParaRPr lang="fr-FR"/>
           </a:p>
@@ -2149,7 +2152,7 @@
           <a:p>
             <a:fld id="{F02C3570-90AD-431D-9871-FE88EA036DFC}" type="slidenum">
               <a:rPr lang="fr-FR" smtClean="0"/>
-              <a:t>‹N°›</a:t>
+              <a:t>‹#›</a:t>
             </a:fld>
             <a:endParaRPr lang="fr-FR"/>
           </a:p>
@@ -2381,7 +2384,7 @@
           <a:p>
             <a:fld id="{02B29D59-80A7-42AB-BA98-B46C05CBCD2D}" type="datetimeFigureOut">
               <a:rPr lang="fr-FR" smtClean="0"/>
-              <a:t>11/11/2013</a:t>
+              <a:t>12/11/13</a:t>
             </a:fld>
             <a:endParaRPr lang="fr-FR"/>
           </a:p>
@@ -2423,7 +2426,7 @@
           <a:p>
             <a:fld id="{F02C3570-90AD-431D-9871-FE88EA036DFC}" type="slidenum">
               <a:rPr lang="fr-FR" smtClean="0"/>
-              <a:t>‹N°›</a:t>
+              <a:t>‹#›</a:t>
             </a:fld>
             <a:endParaRPr lang="fr-FR"/>
           </a:p>
@@ -2686,7 +2689,7 @@
           <a:p>
             <a:fld id="{02B29D59-80A7-42AB-BA98-B46C05CBCD2D}" type="datetimeFigureOut">
               <a:rPr lang="fr-FR" smtClean="0"/>
-              <a:t>11/11/2013</a:t>
+              <a:t>12/11/13</a:t>
             </a:fld>
             <a:endParaRPr lang="fr-FR"/>
           </a:p>
@@ -2728,7 +2731,7 @@
           <a:p>
             <a:fld id="{F02C3570-90AD-431D-9871-FE88EA036DFC}" type="slidenum">
               <a:rPr lang="fr-FR" smtClean="0"/>
-              <a:t>‹N°›</a:t>
+              <a:t>‹#›</a:t>
             </a:fld>
             <a:endParaRPr lang="fr-FR"/>
           </a:p>
@@ -2984,7 +2987,7 @@
           <a:p>
             <a:fld id="{02B29D59-80A7-42AB-BA98-B46C05CBCD2D}" type="datetimeFigureOut">
               <a:rPr lang="fr-FR" smtClean="0"/>
-              <a:t>11/11/2013</a:t>
+              <a:t>12/11/13</a:t>
             </a:fld>
             <a:endParaRPr lang="fr-FR"/>
           </a:p>
@@ -3058,7 +3061,7 @@
           <a:p>
             <a:fld id="{F02C3570-90AD-431D-9871-FE88EA036DFC}" type="slidenum">
               <a:rPr lang="fr-FR" smtClean="0"/>
-              <a:t>‹N°›</a:t>
+              <a:t>‹#›</a:t>
             </a:fld>
             <a:endParaRPr lang="fr-FR"/>
           </a:p>
@@ -3516,7 +3519,7 @@
   <p:timing>
     <p:tnLst>
       <p:par>
-        <p:cTn id="1" dur="indefinite" restart="never" nodeType="tmRoot"/>
+        <p:cTn xmlns:p14="http://schemas.microsoft.com/office/powerpoint/2010/main" id="1" dur="indefinite" restart="never" nodeType="tmRoot"/>
       </p:par>
     </p:tnLst>
   </p:timing>
@@ -3557,6 +3560,1234 @@
           <a:p>
             <a:r>
               <a:rPr lang="fr-FR" dirty="0" smtClean="0"/>
+              <a:t>Ordonnanceurs</a:t>
+            </a:r>
+            <a:endParaRPr lang="fr-FR" dirty="0"/>
+          </a:p>
+        </p:txBody>
+      </p:sp>
+      <p:sp>
+        <p:nvSpPr>
+          <p:cNvPr id="3" name="Espace réservé du contenu 2"/>
+          <p:cNvSpPr>
+            <a:spLocks noGrp="1"/>
+          </p:cNvSpPr>
+          <p:nvPr>
+            <p:ph idx="1"/>
+          </p:nvPr>
+        </p:nvSpPr>
+        <p:spPr/>
+        <p:txBody>
+          <a:bodyPr>
+            <a:normAutofit/>
+          </a:bodyPr>
+          <a:lstStyle/>
+          <a:p>
+            <a:r>
+              <a:rPr lang="fr-FR" dirty="0" smtClean="0"/>
+              <a:t>Un ordonnanceur = une FIFO (liste simplement chainée)</a:t>
+            </a:r>
+          </a:p>
+          <a:p>
+            <a:r>
+              <a:rPr lang="fr-FR" dirty="0" smtClean="0"/>
+              <a:t>Un sémaphore = une FIFO (de même)</a:t>
+            </a:r>
+          </a:p>
+          <a:p>
+            <a:r>
+              <a:rPr lang="fr-FR" dirty="0" smtClean="0"/>
+              <a:t>Un pointeur global sur le PCB courant</a:t>
+            </a:r>
+          </a:p>
+          <a:p>
+            <a:r>
+              <a:rPr lang="fr-FR" dirty="0" smtClean="0"/>
+              <a:t>Ordonnanceur collaboratif</a:t>
+            </a:r>
+            <a:endParaRPr lang="fr-FR" dirty="0" smtClean="0"/>
+          </a:p>
+          <a:p>
+            <a:r>
+              <a:rPr lang="fr-FR" dirty="0" smtClean="0"/>
+              <a:t>Ordonnanceur round robin a priorités</a:t>
+            </a:r>
+          </a:p>
+          <a:p>
+            <a:pPr lvl="1"/>
+            <a:r>
+              <a:rPr lang="fr-FR" dirty="0" smtClean="0"/>
+              <a:t>Nombre de priorités configurable a la compilation</a:t>
+            </a:r>
+          </a:p>
+          <a:p>
+            <a:pPr lvl="1"/>
+            <a:r>
+              <a:rPr lang="fr-FR" dirty="0" smtClean="0"/>
+              <a:t>Sans priorités -&gt; toutes les taches on la même priorité</a:t>
+            </a:r>
+          </a:p>
+          <a:p>
+            <a:r>
+              <a:rPr lang="fr-FR" dirty="0" smtClean="0"/>
+              <a:t>Tous disponible a l’exécution !</a:t>
+            </a:r>
+          </a:p>
+          <a:p>
+            <a:endParaRPr lang="fr-FR" dirty="0" smtClean="0"/>
+          </a:p>
+        </p:txBody>
+      </p:sp>
+    </p:spTree>
+    <p:extLst>
+      <p:ext uri="{BB962C8B-B14F-4D97-AF65-F5344CB8AC3E}">
+        <p14:creationId xmlns:p14="http://schemas.microsoft.com/office/powerpoint/2010/main" val="1461854876"/>
+      </p:ext>
+    </p:extLst>
+  </p:cSld>
+  <p:clrMapOvr>
+    <a:masterClrMapping/>
+  </p:clrMapOvr>
+  <p:timing>
+    <p:tnLst>
+      <p:par>
+        <p:cTn xmlns:p14="http://schemas.microsoft.com/office/powerpoint/2010/main" id="1" dur="indefinite" restart="never" nodeType="tmRoot"/>
+      </p:par>
+    </p:tnLst>
+  </p:timing>
+</p:sld>
+</file>
+
+<file path=ppt/slides/slide3.xml><?xml version="1.0" encoding="utf-8"?>
+<p:sld xmlns:a="http://schemas.openxmlformats.org/drawingml/2006/main" xmlns:r="http://schemas.openxmlformats.org/officeDocument/2006/relationships" xmlns:p="http://schemas.openxmlformats.org/presentationml/2006/main">
+  <p:cSld>
+    <p:spTree>
+      <p:nvGrpSpPr>
+        <p:cNvPr id="1" name=""/>
+        <p:cNvGrpSpPr/>
+        <p:nvPr/>
+      </p:nvGrpSpPr>
+      <p:grpSpPr>
+        <a:xfrm>
+          <a:off x="0" y="0"/>
+          <a:ext cx="0" cy="0"/>
+          <a:chOff x="0" y="0"/>
+          <a:chExt cx="0" cy="0"/>
+        </a:xfrm>
+      </p:grpSpPr>
+      <p:sp>
+        <p:nvSpPr>
+          <p:cNvPr id="18" name="Rectangle 17"/>
+          <p:cNvSpPr/>
+          <p:nvPr/>
+        </p:nvSpPr>
+        <p:spPr>
+          <a:xfrm>
+            <a:off x="1104923" y="2024094"/>
+            <a:ext cx="2414726" cy="1694226"/>
+          </a:xfrm>
+          <a:prstGeom prst="rect">
+            <a:avLst/>
+          </a:prstGeom>
+        </p:spPr>
+        <p:style>
+          <a:lnRef idx="1">
+            <a:schemeClr val="accent2"/>
+          </a:lnRef>
+          <a:fillRef idx="3">
+            <a:schemeClr val="accent2"/>
+          </a:fillRef>
+          <a:effectRef idx="2">
+            <a:schemeClr val="accent2"/>
+          </a:effectRef>
+          <a:fontRef idx="minor">
+            <a:schemeClr val="lt1"/>
+          </a:fontRef>
+        </p:style>
+        <p:txBody>
+          <a:bodyPr rtlCol="0" anchor="ctr"/>
+          <a:lstStyle/>
+          <a:p>
+            <a:pPr algn="ctr"/>
+            <a:endParaRPr lang="fr-FR" dirty="0"/>
+          </a:p>
+        </p:txBody>
+      </p:sp>
+      <p:sp>
+        <p:nvSpPr>
+          <p:cNvPr id="13" name="Rectangle 12"/>
+          <p:cNvSpPr/>
+          <p:nvPr/>
+        </p:nvSpPr>
+        <p:spPr>
+          <a:xfrm>
+            <a:off x="5907307" y="2022097"/>
+            <a:ext cx="2414726" cy="3776809"/>
+          </a:xfrm>
+          <a:prstGeom prst="rect">
+            <a:avLst/>
+          </a:prstGeom>
+        </p:spPr>
+        <p:style>
+          <a:lnRef idx="1">
+            <a:schemeClr val="accent2"/>
+          </a:lnRef>
+          <a:fillRef idx="3">
+            <a:schemeClr val="accent2"/>
+          </a:fillRef>
+          <a:effectRef idx="2">
+            <a:schemeClr val="accent2"/>
+          </a:effectRef>
+          <a:fontRef idx="minor">
+            <a:schemeClr val="lt1"/>
+          </a:fontRef>
+        </p:style>
+        <p:txBody>
+          <a:bodyPr rtlCol="0" anchor="ctr"/>
+          <a:lstStyle/>
+          <a:p>
+            <a:pPr algn="ctr"/>
+            <a:endParaRPr lang="fr-FR" dirty="0"/>
+          </a:p>
+        </p:txBody>
+      </p:sp>
+      <p:sp>
+        <p:nvSpPr>
+          <p:cNvPr id="2" name="Titre 1"/>
+          <p:cNvSpPr>
+            <a:spLocks noGrp="1"/>
+          </p:cNvSpPr>
+          <p:nvPr>
+            <p:ph type="title"/>
+          </p:nvPr>
+        </p:nvSpPr>
+        <p:spPr/>
+        <p:txBody>
+          <a:bodyPr/>
+          <a:lstStyle/>
+          <a:p>
+            <a:r>
+              <a:rPr lang="fr-FR" dirty="0" smtClean="0"/>
+              <a:t>Architecture : </a:t>
+            </a:r>
+            <a:r>
+              <a:rPr lang="fr-FR" dirty="0" err="1" smtClean="0"/>
+              <a:t>FIFOs</a:t>
+            </a:r>
+            <a:endParaRPr lang="fr-FR" dirty="0"/>
+          </a:p>
+        </p:txBody>
+      </p:sp>
+      <p:sp>
+        <p:nvSpPr>
+          <p:cNvPr id="5" name="Rectangle 4"/>
+          <p:cNvSpPr/>
+          <p:nvPr/>
+        </p:nvSpPr>
+        <p:spPr>
+          <a:xfrm>
+            <a:off x="6141260" y="3534491"/>
+            <a:ext cx="1938465" cy="543125"/>
+          </a:xfrm>
+          <a:prstGeom prst="rect">
+            <a:avLst/>
+          </a:prstGeom>
+        </p:spPr>
+        <p:style>
+          <a:lnRef idx="1">
+            <a:schemeClr val="accent1"/>
+          </a:lnRef>
+          <a:fillRef idx="3">
+            <a:schemeClr val="accent1"/>
+          </a:fillRef>
+          <a:effectRef idx="2">
+            <a:schemeClr val="accent1"/>
+          </a:effectRef>
+          <a:fontRef idx="minor">
+            <a:schemeClr val="lt1"/>
+          </a:fontRef>
+        </p:style>
+        <p:txBody>
+          <a:bodyPr rtlCol="0" anchor="ctr"/>
+          <a:lstStyle/>
+          <a:p>
+            <a:pPr algn="ctr"/>
+            <a:r>
+              <a:rPr lang="fr-FR" dirty="0" smtClean="0"/>
+              <a:t>Round Robin </a:t>
+            </a:r>
+            <a:r>
+              <a:rPr lang="fr-FR" dirty="0" smtClean="0"/>
+              <a:t>…</a:t>
+            </a:r>
+            <a:endParaRPr lang="fr-FR" dirty="0"/>
+          </a:p>
+        </p:txBody>
+      </p:sp>
+      <p:sp>
+        <p:nvSpPr>
+          <p:cNvPr id="6" name="Rectangle 5"/>
+          <p:cNvSpPr/>
+          <p:nvPr/>
+        </p:nvSpPr>
+        <p:spPr>
+          <a:xfrm>
+            <a:off x="1455851" y="4363709"/>
+            <a:ext cx="1696157" cy="543125"/>
+          </a:xfrm>
+          <a:prstGeom prst="rect">
+            <a:avLst/>
+          </a:prstGeom>
+        </p:spPr>
+        <p:style>
+          <a:lnRef idx="1">
+            <a:schemeClr val="accent1"/>
+          </a:lnRef>
+          <a:fillRef idx="3">
+            <a:schemeClr val="accent1"/>
+          </a:fillRef>
+          <a:effectRef idx="2">
+            <a:schemeClr val="accent1"/>
+          </a:effectRef>
+          <a:fontRef idx="minor">
+            <a:schemeClr val="lt1"/>
+          </a:fontRef>
+        </p:style>
+        <p:txBody>
+          <a:bodyPr rtlCol="0" anchor="ctr"/>
+          <a:lstStyle/>
+          <a:p>
+            <a:pPr algn="ctr"/>
+            <a:r>
+              <a:rPr lang="fr-FR" dirty="0" smtClean="0"/>
+              <a:t>Pause</a:t>
+            </a:r>
+            <a:endParaRPr lang="fr-FR" dirty="0"/>
+          </a:p>
+        </p:txBody>
+      </p:sp>
+      <p:sp>
+        <p:nvSpPr>
+          <p:cNvPr id="8" name="Rectangle 7"/>
+          <p:cNvSpPr/>
+          <p:nvPr/>
+        </p:nvSpPr>
+        <p:spPr>
+          <a:xfrm>
+            <a:off x="6143262" y="4288507"/>
+            <a:ext cx="1938465" cy="543125"/>
+          </a:xfrm>
+          <a:prstGeom prst="rect">
+            <a:avLst/>
+          </a:prstGeom>
+        </p:spPr>
+        <p:style>
+          <a:lnRef idx="1">
+            <a:schemeClr val="accent1"/>
+          </a:lnRef>
+          <a:fillRef idx="3">
+            <a:schemeClr val="accent1"/>
+          </a:fillRef>
+          <a:effectRef idx="2">
+            <a:schemeClr val="accent1"/>
+          </a:effectRef>
+          <a:fontRef idx="minor">
+            <a:schemeClr val="lt1"/>
+          </a:fontRef>
+        </p:style>
+        <p:txBody>
+          <a:bodyPr rtlCol="0" anchor="ctr"/>
+          <a:lstStyle/>
+          <a:p>
+            <a:pPr algn="ctr"/>
+            <a:r>
+              <a:rPr lang="fr-FR" dirty="0" smtClean="0"/>
+              <a:t>Round Robin 1</a:t>
+            </a:r>
+            <a:endParaRPr lang="fr-FR" dirty="0"/>
+          </a:p>
+        </p:txBody>
+      </p:sp>
+      <p:sp>
+        <p:nvSpPr>
+          <p:cNvPr id="9" name="Rectangle 8"/>
+          <p:cNvSpPr/>
+          <p:nvPr/>
+        </p:nvSpPr>
+        <p:spPr>
+          <a:xfrm>
+            <a:off x="6145263" y="5050878"/>
+            <a:ext cx="1938465" cy="543125"/>
+          </a:xfrm>
+          <a:prstGeom prst="rect">
+            <a:avLst/>
+          </a:prstGeom>
+        </p:spPr>
+        <p:style>
+          <a:lnRef idx="1">
+            <a:schemeClr val="accent1"/>
+          </a:lnRef>
+          <a:fillRef idx="3">
+            <a:schemeClr val="accent1"/>
+          </a:fillRef>
+          <a:effectRef idx="2">
+            <a:schemeClr val="accent1"/>
+          </a:effectRef>
+          <a:fontRef idx="minor">
+            <a:schemeClr val="lt1"/>
+          </a:fontRef>
+        </p:style>
+        <p:txBody>
+          <a:bodyPr rtlCol="0" anchor="ctr"/>
+          <a:lstStyle/>
+          <a:p>
+            <a:pPr algn="ctr"/>
+            <a:r>
+              <a:rPr lang="fr-FR" dirty="0" smtClean="0"/>
+              <a:t>Round Robin </a:t>
+            </a:r>
+            <a:r>
+              <a:rPr lang="fr-FR" dirty="0" smtClean="0"/>
+              <a:t>0</a:t>
+            </a:r>
+            <a:endParaRPr lang="fr-FR" dirty="0"/>
+          </a:p>
+        </p:txBody>
+      </p:sp>
+      <p:sp>
+        <p:nvSpPr>
+          <p:cNvPr id="10" name="Rectangle 9"/>
+          <p:cNvSpPr/>
+          <p:nvPr/>
+        </p:nvSpPr>
+        <p:spPr>
+          <a:xfrm>
+            <a:off x="1432789" y="2886734"/>
+            <a:ext cx="1696157" cy="543125"/>
+          </a:xfrm>
+          <a:prstGeom prst="rect">
+            <a:avLst/>
+          </a:prstGeom>
+        </p:spPr>
+        <p:style>
+          <a:lnRef idx="1">
+            <a:schemeClr val="accent1"/>
+          </a:lnRef>
+          <a:fillRef idx="3">
+            <a:schemeClr val="accent1"/>
+          </a:fillRef>
+          <a:effectRef idx="2">
+            <a:schemeClr val="accent1"/>
+          </a:effectRef>
+          <a:fontRef idx="minor">
+            <a:schemeClr val="lt1"/>
+          </a:fontRef>
+        </p:style>
+        <p:txBody>
+          <a:bodyPr rtlCol="0" anchor="ctr"/>
+          <a:lstStyle/>
+          <a:p>
+            <a:pPr algn="ctr"/>
+            <a:r>
+              <a:rPr lang="fr-FR" dirty="0" smtClean="0"/>
+              <a:t>List d’attente</a:t>
+            </a:r>
+            <a:endParaRPr lang="fr-FR" dirty="0"/>
+          </a:p>
+        </p:txBody>
+      </p:sp>
+      <p:sp>
+        <p:nvSpPr>
+          <p:cNvPr id="12" name="Rectangle 11"/>
+          <p:cNvSpPr/>
+          <p:nvPr/>
+        </p:nvSpPr>
+        <p:spPr>
+          <a:xfrm>
+            <a:off x="6143262" y="2784468"/>
+            <a:ext cx="1938465" cy="543125"/>
+          </a:xfrm>
+          <a:prstGeom prst="rect">
+            <a:avLst/>
+          </a:prstGeom>
+        </p:spPr>
+        <p:style>
+          <a:lnRef idx="1">
+            <a:schemeClr val="accent1"/>
+          </a:lnRef>
+          <a:fillRef idx="3">
+            <a:schemeClr val="accent1"/>
+          </a:fillRef>
+          <a:effectRef idx="2">
+            <a:schemeClr val="accent1"/>
+          </a:effectRef>
+          <a:fontRef idx="minor">
+            <a:schemeClr val="lt1"/>
+          </a:fontRef>
+        </p:style>
+        <p:txBody>
+          <a:bodyPr rtlCol="0" anchor="ctr"/>
+          <a:lstStyle/>
+          <a:p>
+            <a:pPr algn="ctr"/>
+            <a:r>
+              <a:rPr lang="en-CA" dirty="0" err="1" smtClean="0"/>
+              <a:t>Collaboratif</a:t>
+            </a:r>
+            <a:endParaRPr lang="fr-FR" dirty="0"/>
+          </a:p>
+        </p:txBody>
+      </p:sp>
+      <p:sp>
+        <p:nvSpPr>
+          <p:cNvPr id="14" name="ZoneTexte 13"/>
+          <p:cNvSpPr txBox="1"/>
+          <p:nvPr/>
+        </p:nvSpPr>
+        <p:spPr>
+          <a:xfrm>
+            <a:off x="6224813" y="2164147"/>
+            <a:ext cx="1775809" cy="369332"/>
+          </a:xfrm>
+          <a:prstGeom prst="rect">
+            <a:avLst/>
+          </a:prstGeom>
+          <a:noFill/>
+        </p:spPr>
+        <p:txBody>
+          <a:bodyPr wrap="none" rtlCol="0">
+            <a:spAutoFit/>
+          </a:bodyPr>
+          <a:lstStyle/>
+          <a:p>
+            <a:pPr algn="ctr"/>
+            <a:r>
+              <a:rPr lang="fr-FR" dirty="0" smtClean="0">
+                <a:solidFill>
+                  <a:schemeClr val="bg1"/>
+                </a:solidFill>
+              </a:rPr>
+              <a:t>Ordonnanceurs</a:t>
+            </a:r>
+            <a:endParaRPr lang="fr-FR" dirty="0">
+              <a:solidFill>
+                <a:schemeClr val="bg1"/>
+              </a:solidFill>
+            </a:endParaRPr>
+          </a:p>
+        </p:txBody>
+      </p:sp>
+      <p:sp>
+        <p:nvSpPr>
+          <p:cNvPr id="15" name="ZoneTexte 14"/>
+          <p:cNvSpPr txBox="1"/>
+          <p:nvPr/>
+        </p:nvSpPr>
+        <p:spPr>
+          <a:xfrm>
+            <a:off x="1612956" y="2283124"/>
+            <a:ext cx="1378052" cy="369332"/>
+          </a:xfrm>
+          <a:prstGeom prst="rect">
+            <a:avLst/>
+          </a:prstGeom>
+          <a:noFill/>
+        </p:spPr>
+        <p:txBody>
+          <a:bodyPr wrap="none" rtlCol="0">
+            <a:spAutoFit/>
+          </a:bodyPr>
+          <a:lstStyle/>
+          <a:p>
+            <a:pPr algn="ctr"/>
+            <a:r>
+              <a:rPr lang="fr-FR" dirty="0" smtClean="0">
+                <a:solidFill>
+                  <a:schemeClr val="bg1"/>
+                </a:solidFill>
+              </a:rPr>
+              <a:t>Sémaphore</a:t>
+            </a:r>
+            <a:endParaRPr lang="fr-FR" dirty="0">
+              <a:solidFill>
+                <a:schemeClr val="bg1"/>
+              </a:solidFill>
+            </a:endParaRPr>
+          </a:p>
+        </p:txBody>
+      </p:sp>
+      <p:cxnSp>
+        <p:nvCxnSpPr>
+          <p:cNvPr id="17" name="Connecteur droit 16"/>
+          <p:cNvCxnSpPr/>
+          <p:nvPr/>
+        </p:nvCxnSpPr>
+        <p:spPr>
+          <a:xfrm>
+            <a:off x="4603865" y="1729645"/>
+            <a:ext cx="16711" cy="4746078"/>
+          </a:xfrm>
+          <a:prstGeom prst="line">
+            <a:avLst/>
+          </a:prstGeom>
+          <a:ln>
+            <a:solidFill>
+              <a:schemeClr val="accent2"/>
+            </a:solidFill>
+            <a:prstDash val="dash"/>
+          </a:ln>
+        </p:spPr>
+        <p:style>
+          <a:lnRef idx="2">
+            <a:schemeClr val="accent1"/>
+          </a:lnRef>
+          <a:fillRef idx="0">
+            <a:schemeClr val="accent1"/>
+          </a:fillRef>
+          <a:effectRef idx="1">
+            <a:schemeClr val="accent1"/>
+          </a:effectRef>
+          <a:fontRef idx="minor">
+            <a:schemeClr val="tx1"/>
+          </a:fontRef>
+        </p:style>
+      </p:cxnSp>
+      <p:sp>
+        <p:nvSpPr>
+          <p:cNvPr id="19" name="ZoneTexte 18"/>
+          <p:cNvSpPr txBox="1"/>
+          <p:nvPr/>
+        </p:nvSpPr>
+        <p:spPr>
+          <a:xfrm>
+            <a:off x="3506841" y="5999444"/>
+            <a:ext cx="890576" cy="369332"/>
+          </a:xfrm>
+          <a:prstGeom prst="rect">
+            <a:avLst/>
+          </a:prstGeom>
+          <a:noFill/>
+        </p:spPr>
+        <p:txBody>
+          <a:bodyPr wrap="none" rtlCol="0">
+            <a:spAutoFit/>
+          </a:bodyPr>
+          <a:lstStyle/>
+          <a:p>
+            <a:pPr algn="r"/>
+            <a:r>
+              <a:rPr lang="fr-FR" dirty="0" smtClean="0"/>
+              <a:t>attente</a:t>
+            </a:r>
+            <a:endParaRPr lang="fr-FR" dirty="0"/>
+          </a:p>
+        </p:txBody>
+      </p:sp>
+      <p:sp>
+        <p:nvSpPr>
+          <p:cNvPr id="20" name="ZoneTexte 19"/>
+          <p:cNvSpPr txBox="1"/>
+          <p:nvPr/>
+        </p:nvSpPr>
+        <p:spPr>
+          <a:xfrm>
+            <a:off x="4819722" y="6001440"/>
+            <a:ext cx="1814244" cy="369332"/>
+          </a:xfrm>
+          <a:prstGeom prst="rect">
+            <a:avLst/>
+          </a:prstGeom>
+          <a:noFill/>
+        </p:spPr>
+        <p:txBody>
+          <a:bodyPr wrap="none" rtlCol="0">
+            <a:spAutoFit/>
+          </a:bodyPr>
+          <a:lstStyle/>
+          <a:p>
+            <a:r>
+              <a:rPr lang="fr-FR" dirty="0" smtClean="0"/>
+              <a:t>près / exécution</a:t>
+            </a:r>
+            <a:endParaRPr lang="fr-FR" dirty="0"/>
+          </a:p>
+        </p:txBody>
+      </p:sp>
+    </p:spTree>
+    <p:extLst>
+      <p:ext uri="{BB962C8B-B14F-4D97-AF65-F5344CB8AC3E}">
+        <p14:creationId xmlns:p14="http://schemas.microsoft.com/office/powerpoint/2010/main" val="1170686574"/>
+      </p:ext>
+    </p:extLst>
+  </p:cSld>
+  <p:clrMapOvr>
+    <a:masterClrMapping/>
+  </p:clrMapOvr>
+  <p:timing>
+    <p:tnLst>
+      <p:par>
+        <p:cTn xmlns:p14="http://schemas.microsoft.com/office/powerpoint/2010/main" id="1" dur="indefinite" restart="never" nodeType="tmRoot"/>
+      </p:par>
+    </p:tnLst>
+  </p:timing>
+</p:sld>
+</file>
+
+<file path=ppt/slides/slide4.xml><?xml version="1.0" encoding="utf-8"?>
+<p:sld xmlns:a="http://schemas.openxmlformats.org/drawingml/2006/main" xmlns:r="http://schemas.openxmlformats.org/officeDocument/2006/relationships" xmlns:p="http://schemas.openxmlformats.org/presentationml/2006/main">
+  <p:cSld>
+    <p:spTree>
+      <p:nvGrpSpPr>
+        <p:cNvPr id="1" name=""/>
+        <p:cNvGrpSpPr/>
+        <p:nvPr/>
+      </p:nvGrpSpPr>
+      <p:grpSpPr>
+        <a:xfrm>
+          <a:off x="0" y="0"/>
+          <a:ext cx="0" cy="0"/>
+          <a:chOff x="0" y="0"/>
+          <a:chExt cx="0" cy="0"/>
+        </a:xfrm>
+      </p:grpSpPr>
+      <p:sp>
+        <p:nvSpPr>
+          <p:cNvPr id="2" name="Titre 1"/>
+          <p:cNvSpPr>
+            <a:spLocks noGrp="1"/>
+          </p:cNvSpPr>
+          <p:nvPr>
+            <p:ph type="title"/>
+          </p:nvPr>
+        </p:nvSpPr>
+        <p:spPr/>
+        <p:txBody>
+          <a:bodyPr/>
+          <a:lstStyle/>
+          <a:p>
+            <a:r>
+              <a:rPr lang="fr-FR" dirty="0" err="1" smtClean="0"/>
+              <a:t>Process</a:t>
+            </a:r>
+            <a:r>
+              <a:rPr lang="fr-FR" dirty="0" smtClean="0"/>
+              <a:t> Control Block</a:t>
+            </a:r>
+            <a:endParaRPr lang="fr-FR" dirty="0"/>
+          </a:p>
+        </p:txBody>
+      </p:sp>
+      <p:sp>
+        <p:nvSpPr>
+          <p:cNvPr id="3" name="Espace réservé du contenu 2"/>
+          <p:cNvSpPr>
+            <a:spLocks noGrp="1"/>
+          </p:cNvSpPr>
+          <p:nvPr>
+            <p:ph idx="1"/>
+          </p:nvPr>
+        </p:nvSpPr>
+        <p:spPr/>
+        <p:txBody>
+          <a:bodyPr>
+            <a:normAutofit/>
+          </a:bodyPr>
+          <a:lstStyle/>
+          <a:p>
+            <a:r>
+              <a:rPr lang="fr-FR" dirty="0" smtClean="0"/>
+              <a:t>U</a:t>
+            </a:r>
+            <a:r>
+              <a:rPr lang="fr-FR" dirty="0" smtClean="0"/>
+              <a:t>n </a:t>
+            </a:r>
+            <a:r>
+              <a:rPr lang="fr-FR" dirty="0" err="1" smtClean="0"/>
+              <a:t>process</a:t>
+            </a:r>
+            <a:r>
+              <a:rPr lang="fr-FR" dirty="0" smtClean="0"/>
+              <a:t> ID unique</a:t>
+            </a:r>
+          </a:p>
+          <a:p>
+            <a:r>
+              <a:rPr lang="fr-FR" dirty="0">
+                <a:latin typeface="Consolas" panose="020B0609020204030204" pitchFamily="49" charset="0"/>
+                <a:cs typeface="Consolas" panose="020B0609020204030204" pitchFamily="49" charset="0"/>
+              </a:rPr>
+              <a:t>Pointeur sur la </a:t>
+            </a:r>
+            <a:r>
+              <a:rPr lang="fr-FR" dirty="0" smtClean="0">
+                <a:latin typeface="Consolas" panose="020B0609020204030204" pitchFamily="49" charset="0"/>
+                <a:cs typeface="Consolas" panose="020B0609020204030204" pitchFamily="49" charset="0"/>
+              </a:rPr>
+              <a:t>pile</a:t>
+            </a:r>
+          </a:p>
+          <a:p>
+            <a:endParaRPr lang="fr-FR" dirty="0">
+              <a:latin typeface="Consolas" panose="020B0609020204030204" pitchFamily="49" charset="0"/>
+              <a:cs typeface="Consolas" panose="020B0609020204030204" pitchFamily="49" charset="0"/>
+            </a:endParaRPr>
+          </a:p>
+          <a:p>
+            <a:endParaRPr lang="fr-FR" dirty="0" smtClean="0">
+              <a:latin typeface="Consolas" panose="020B0609020204030204" pitchFamily="49" charset="0"/>
+              <a:cs typeface="Consolas" panose="020B0609020204030204" pitchFamily="49" charset="0"/>
+            </a:endParaRPr>
+          </a:p>
+          <a:p>
+            <a:endParaRPr lang="fr-FR" dirty="0">
+              <a:latin typeface="Consolas" panose="020B0609020204030204" pitchFamily="49" charset="0"/>
+              <a:cs typeface="Consolas" panose="020B0609020204030204" pitchFamily="49" charset="0"/>
+            </a:endParaRPr>
+          </a:p>
+          <a:p>
+            <a:endParaRPr lang="fr-FR" dirty="0" smtClean="0">
+              <a:latin typeface="Consolas" panose="020B0609020204030204" pitchFamily="49" charset="0"/>
+              <a:cs typeface="Consolas" panose="020B0609020204030204" pitchFamily="49" charset="0"/>
+            </a:endParaRPr>
+          </a:p>
+          <a:p>
+            <a:endParaRPr lang="fr-FR" dirty="0">
+              <a:latin typeface="Consolas" panose="020B0609020204030204" pitchFamily="49" charset="0"/>
+              <a:cs typeface="Consolas" panose="020B0609020204030204" pitchFamily="49" charset="0"/>
+            </a:endParaRPr>
+          </a:p>
+          <a:p>
+            <a:endParaRPr lang="fr-FR" dirty="0" smtClean="0"/>
+          </a:p>
+          <a:p>
+            <a:r>
+              <a:rPr lang="fr-FR" dirty="0" smtClean="0">
+                <a:latin typeface="Consolas" panose="020B0609020204030204" pitchFamily="49" charset="0"/>
+                <a:cs typeface="Consolas" panose="020B0609020204030204" pitchFamily="49" charset="0"/>
+              </a:rPr>
+              <a:t>Liste chainée de tout les </a:t>
+            </a:r>
+            <a:r>
+              <a:rPr lang="fr-FR" dirty="0" err="1" smtClean="0">
+                <a:latin typeface="Consolas" panose="020B0609020204030204" pitchFamily="49" charset="0"/>
+                <a:cs typeface="Consolas" panose="020B0609020204030204" pitchFamily="49" charset="0"/>
+              </a:rPr>
+              <a:t>PCBs</a:t>
+            </a:r>
+            <a:endParaRPr lang="fr-FR" dirty="0" smtClean="0">
+              <a:latin typeface="Consolas" panose="020B0609020204030204" pitchFamily="49" charset="0"/>
+              <a:cs typeface="Consolas" panose="020B0609020204030204" pitchFamily="49" charset="0"/>
+            </a:endParaRPr>
+          </a:p>
+          <a:p>
+            <a:r>
+              <a:rPr lang="fr-FR" dirty="0" smtClean="0">
+                <a:latin typeface="Consolas" panose="020B0609020204030204" pitchFamily="49" charset="0"/>
+                <a:cs typeface="Consolas" panose="020B0609020204030204" pitchFamily="49" charset="0"/>
+              </a:rPr>
+              <a:t>Pointeur sur la </a:t>
+            </a:r>
+            <a:r>
+              <a:rPr lang="fr-FR" dirty="0" smtClean="0">
+                <a:solidFill>
+                  <a:schemeClr val="tx2"/>
+                </a:solidFill>
+                <a:latin typeface="Consolas" panose="020B0609020204030204" pitchFamily="49" charset="0"/>
+                <a:cs typeface="Consolas" panose="020B0609020204030204" pitchFamily="49" charset="0"/>
+              </a:rPr>
+              <a:t>liste de l’ordonnanceur</a:t>
+            </a:r>
+          </a:p>
+          <a:p>
+            <a:r>
+              <a:rPr lang="fr-FR" dirty="0" smtClean="0">
+                <a:latin typeface="Consolas" panose="020B0609020204030204" pitchFamily="49" charset="0"/>
+                <a:cs typeface="Consolas" panose="020B0609020204030204" pitchFamily="49" charset="0"/>
+              </a:rPr>
+              <a:t>Pointeur sur la </a:t>
+            </a:r>
+            <a:r>
+              <a:rPr lang="fr-FR" dirty="0" smtClean="0">
+                <a:solidFill>
+                  <a:schemeClr val="accent1">
+                    <a:lumMod val="75000"/>
+                  </a:schemeClr>
+                </a:solidFill>
+                <a:latin typeface="Consolas" panose="020B0609020204030204" pitchFamily="49" charset="0"/>
+                <a:cs typeface="Consolas" panose="020B0609020204030204" pitchFamily="49" charset="0"/>
+              </a:rPr>
+              <a:t>liste dans laquelle il est</a:t>
+            </a:r>
+          </a:p>
+        </p:txBody>
+      </p:sp>
+      <p:sp>
+        <p:nvSpPr>
+          <p:cNvPr id="5" name="Rectangle 4"/>
+          <p:cNvSpPr/>
+          <p:nvPr/>
+        </p:nvSpPr>
+        <p:spPr>
+          <a:xfrm>
+            <a:off x="5449759" y="2985007"/>
+            <a:ext cx="1938465" cy="543125"/>
+          </a:xfrm>
+          <a:prstGeom prst="rect">
+            <a:avLst/>
+          </a:prstGeom>
+        </p:spPr>
+        <p:style>
+          <a:lnRef idx="2">
+            <a:schemeClr val="accent6">
+              <a:shade val="50000"/>
+            </a:schemeClr>
+          </a:lnRef>
+          <a:fillRef idx="1">
+            <a:schemeClr val="accent6"/>
+          </a:fillRef>
+          <a:effectRef idx="0">
+            <a:schemeClr val="accent6"/>
+          </a:effectRef>
+          <a:fontRef idx="minor">
+            <a:schemeClr val="lt1"/>
+          </a:fontRef>
+        </p:style>
+        <p:txBody>
+          <a:bodyPr rtlCol="0" anchor="ctr"/>
+          <a:lstStyle/>
+          <a:p>
+            <a:pPr algn="ctr"/>
+            <a:r>
+              <a:rPr lang="fr-FR" dirty="0" smtClean="0"/>
+              <a:t>Round Robin 1</a:t>
+            </a:r>
+            <a:endParaRPr lang="fr-FR" dirty="0"/>
+          </a:p>
+        </p:txBody>
+      </p:sp>
+      <p:sp>
+        <p:nvSpPr>
+          <p:cNvPr id="6" name="Rectangle 5"/>
+          <p:cNvSpPr/>
+          <p:nvPr/>
+        </p:nvSpPr>
+        <p:spPr>
+          <a:xfrm>
+            <a:off x="5451760" y="4039830"/>
+            <a:ext cx="1938465" cy="543125"/>
+          </a:xfrm>
+          <a:prstGeom prst="rect">
+            <a:avLst/>
+          </a:prstGeom>
+        </p:spPr>
+        <p:style>
+          <a:lnRef idx="1">
+            <a:schemeClr val="accent1"/>
+          </a:lnRef>
+          <a:fillRef idx="3">
+            <a:schemeClr val="accent1"/>
+          </a:fillRef>
+          <a:effectRef idx="2">
+            <a:schemeClr val="accent1"/>
+          </a:effectRef>
+          <a:fontRef idx="minor">
+            <a:schemeClr val="lt1"/>
+          </a:fontRef>
+        </p:style>
+        <p:txBody>
+          <a:bodyPr rtlCol="0" anchor="ctr"/>
+          <a:lstStyle/>
+          <a:p>
+            <a:pPr algn="ctr"/>
+            <a:r>
+              <a:rPr lang="fr-FR" dirty="0" smtClean="0"/>
+              <a:t>Pause</a:t>
+            </a:r>
+          </a:p>
+        </p:txBody>
+      </p:sp>
+      <p:sp>
+        <p:nvSpPr>
+          <p:cNvPr id="7" name="Rectangle 6"/>
+          <p:cNvSpPr/>
+          <p:nvPr/>
+        </p:nvSpPr>
+        <p:spPr>
+          <a:xfrm>
+            <a:off x="1727230" y="3225328"/>
+            <a:ext cx="1938465" cy="1219943"/>
+          </a:xfrm>
+          <a:prstGeom prst="rect">
+            <a:avLst/>
+          </a:prstGeom>
+        </p:spPr>
+        <p:style>
+          <a:lnRef idx="1">
+            <a:schemeClr val="accent5"/>
+          </a:lnRef>
+          <a:fillRef idx="3">
+            <a:schemeClr val="accent5"/>
+          </a:fillRef>
+          <a:effectRef idx="2">
+            <a:schemeClr val="accent5"/>
+          </a:effectRef>
+          <a:fontRef idx="minor">
+            <a:schemeClr val="lt1"/>
+          </a:fontRef>
+        </p:style>
+        <p:txBody>
+          <a:bodyPr rtlCol="0" anchor="ctr"/>
+          <a:lstStyle/>
+          <a:p>
+            <a:pPr algn="ctr"/>
+            <a:r>
+              <a:rPr lang="fr-FR" dirty="0" smtClean="0"/>
+              <a:t>PCB</a:t>
+            </a:r>
+          </a:p>
+          <a:p>
+            <a:pPr algn="ctr"/>
+            <a:r>
+              <a:rPr lang="fr-FR" dirty="0" err="1" smtClean="0"/>
+              <a:t>p</a:t>
+            </a:r>
+            <a:r>
+              <a:rPr lang="fr-FR" dirty="0" err="1" smtClean="0"/>
+              <a:t>id</a:t>
+            </a:r>
+            <a:r>
+              <a:rPr lang="fr-FR" dirty="0" smtClean="0"/>
+              <a:t> = 42</a:t>
+            </a:r>
+          </a:p>
+          <a:p>
+            <a:pPr algn="ctr"/>
+            <a:r>
+              <a:rPr lang="fr-FR" dirty="0" smtClean="0"/>
+              <a:t>état</a:t>
+            </a:r>
+            <a:r>
+              <a:rPr lang="fr-FR" dirty="0" smtClean="0"/>
+              <a:t> = attente</a:t>
+            </a:r>
+          </a:p>
+        </p:txBody>
+      </p:sp>
+      <p:cxnSp>
+        <p:nvCxnSpPr>
+          <p:cNvPr id="9" name="Connecteur en arc 8"/>
+          <p:cNvCxnSpPr/>
+          <p:nvPr/>
+        </p:nvCxnSpPr>
+        <p:spPr>
+          <a:xfrm flipV="1">
+            <a:off x="3759954" y="3292174"/>
+            <a:ext cx="1612603" cy="509702"/>
+          </a:xfrm>
+          <a:prstGeom prst="curvedConnector3">
+            <a:avLst/>
+          </a:prstGeom>
+          <a:ln>
+            <a:solidFill>
+              <a:schemeClr val="tx2">
+                <a:lumMod val="75000"/>
+              </a:schemeClr>
+            </a:solidFill>
+            <a:tailEnd type="arrow"/>
+          </a:ln>
+        </p:spPr>
+        <p:style>
+          <a:lnRef idx="2">
+            <a:schemeClr val="accent1"/>
+          </a:lnRef>
+          <a:fillRef idx="0">
+            <a:schemeClr val="accent1"/>
+          </a:fillRef>
+          <a:effectRef idx="1">
+            <a:schemeClr val="accent1"/>
+          </a:effectRef>
+          <a:fontRef idx="minor">
+            <a:schemeClr val="tx1"/>
+          </a:fontRef>
+        </p:style>
+      </p:cxnSp>
+      <p:cxnSp>
+        <p:nvCxnSpPr>
+          <p:cNvPr id="10" name="Connecteur en arc 9"/>
+          <p:cNvCxnSpPr/>
+          <p:nvPr/>
+        </p:nvCxnSpPr>
+        <p:spPr>
+          <a:xfrm>
+            <a:off x="3761956" y="3920853"/>
+            <a:ext cx="1602245" cy="365658"/>
+          </a:xfrm>
+          <a:prstGeom prst="curvedConnector3">
+            <a:avLst/>
+          </a:prstGeom>
+          <a:ln>
+            <a:solidFill>
+              <a:schemeClr val="accent1">
+                <a:lumMod val="75000"/>
+              </a:schemeClr>
+            </a:solidFill>
+            <a:tailEnd type="arrow"/>
+          </a:ln>
+        </p:spPr>
+        <p:style>
+          <a:lnRef idx="2">
+            <a:schemeClr val="accent1"/>
+          </a:lnRef>
+          <a:fillRef idx="0">
+            <a:schemeClr val="accent1"/>
+          </a:fillRef>
+          <a:effectRef idx="1">
+            <a:schemeClr val="accent1"/>
+          </a:effectRef>
+          <a:fontRef idx="minor">
+            <a:schemeClr val="tx1"/>
+          </a:fontRef>
+        </p:style>
+      </p:cxnSp>
+      <p:sp>
+        <p:nvSpPr>
+          <p:cNvPr id="12" name="Forme libre 11"/>
+          <p:cNvSpPr/>
+          <p:nvPr/>
+        </p:nvSpPr>
+        <p:spPr>
+          <a:xfrm>
+            <a:off x="3801732" y="4361713"/>
+            <a:ext cx="1487270" cy="444877"/>
+          </a:xfrm>
+          <a:custGeom>
+            <a:avLst/>
+            <a:gdLst>
+              <a:gd name="connsiteX0" fmla="*/ 1487270 w 1487270"/>
+              <a:gd name="connsiteY0" fmla="*/ 133692 h 444877"/>
+              <a:gd name="connsiteX1" fmla="*/ 718569 w 1487270"/>
+              <a:gd name="connsiteY1" fmla="*/ 442856 h 444877"/>
+              <a:gd name="connsiteX2" fmla="*/ 0 w 1487270"/>
+              <a:gd name="connsiteY2" fmla="*/ 0 h 444877"/>
+            </a:gdLst>
+            <a:ahLst/>
+            <a:cxnLst>
+              <a:cxn ang="0">
+                <a:pos x="connsiteX0" y="connsiteY0"/>
+              </a:cxn>
+              <a:cxn ang="0">
+                <a:pos x="connsiteX1" y="connsiteY1"/>
+              </a:cxn>
+              <a:cxn ang="0">
+                <a:pos x="connsiteX2" y="connsiteY2"/>
+              </a:cxn>
+            </a:cxnLst>
+            <a:rect l="l" t="t" r="r" b="b"/>
+            <a:pathLst>
+              <a:path w="1487270" h="444877">
+                <a:moveTo>
+                  <a:pt x="1487270" y="133692"/>
+                </a:moveTo>
+                <a:cubicBezTo>
+                  <a:pt x="1226858" y="299415"/>
+                  <a:pt x="966447" y="465138"/>
+                  <a:pt x="718569" y="442856"/>
+                </a:cubicBezTo>
+                <a:cubicBezTo>
+                  <a:pt x="470691" y="420574"/>
+                  <a:pt x="115584" y="98877"/>
+                  <a:pt x="0" y="0"/>
+                </a:cubicBezTo>
+              </a:path>
+            </a:pathLst>
+          </a:custGeom>
+          <a:ln>
+            <a:solidFill>
+              <a:srgbClr val="6B7D72"/>
+            </a:solidFill>
+            <a:prstDash val="sysDash"/>
+            <a:headEnd type="none"/>
+            <a:tailEnd type="arrow"/>
+          </a:ln>
+        </p:spPr>
+        <p:style>
+          <a:lnRef idx="2">
+            <a:schemeClr val="accent1"/>
+          </a:lnRef>
+          <a:fillRef idx="0">
+            <a:schemeClr val="accent1"/>
+          </a:fillRef>
+          <a:effectRef idx="1">
+            <a:schemeClr val="accent1"/>
+          </a:effectRef>
+          <a:fontRef idx="minor">
+            <a:schemeClr val="tx1"/>
+          </a:fontRef>
+        </p:style>
+        <p:txBody>
+          <a:bodyPr rtlCol="0" anchor="ctr"/>
+          <a:lstStyle/>
+          <a:p>
+            <a:pPr algn="ctr"/>
+            <a:endParaRPr lang="fr-FR"/>
+          </a:p>
+        </p:txBody>
+      </p:sp>
+    </p:spTree>
+    <p:extLst>
+      <p:ext uri="{BB962C8B-B14F-4D97-AF65-F5344CB8AC3E}">
+        <p14:creationId xmlns:p14="http://schemas.microsoft.com/office/powerpoint/2010/main" val="2192414701"/>
+      </p:ext>
+    </p:extLst>
+  </p:cSld>
+  <p:clrMapOvr>
+    <a:masterClrMapping/>
+  </p:clrMapOvr>
+  <p:timing>
+    <p:tnLst>
+      <p:par>
+        <p:cTn xmlns:p14="http://schemas.microsoft.com/office/powerpoint/2010/main" id="1" dur="indefinite" restart="never" nodeType="tmRoot"/>
+      </p:par>
+    </p:tnLst>
+  </p:timing>
+</p:sld>
+</file>
+
+<file path=ppt/slides/slide5.xml><?xml version="1.0" encoding="utf-8"?>
+<p:sld xmlns:a="http://schemas.openxmlformats.org/drawingml/2006/main" xmlns:r="http://schemas.openxmlformats.org/officeDocument/2006/relationships" xmlns:p="http://schemas.openxmlformats.org/presentationml/2006/main">
+  <p:cSld>
+    <p:spTree>
+      <p:nvGrpSpPr>
+        <p:cNvPr id="1" name=""/>
+        <p:cNvGrpSpPr/>
+        <p:nvPr/>
+      </p:nvGrpSpPr>
+      <p:grpSpPr>
+        <a:xfrm>
+          <a:off x="0" y="0"/>
+          <a:ext cx="0" cy="0"/>
+          <a:chOff x="0" y="0"/>
+          <a:chExt cx="0" cy="0"/>
+        </a:xfrm>
+      </p:grpSpPr>
+      <p:sp>
+        <p:nvSpPr>
+          <p:cNvPr id="2" name="Titre 1"/>
+          <p:cNvSpPr>
+            <a:spLocks noGrp="1"/>
+          </p:cNvSpPr>
+          <p:nvPr>
+            <p:ph type="title"/>
+          </p:nvPr>
+        </p:nvSpPr>
+        <p:spPr/>
+        <p:txBody>
+          <a:bodyPr/>
+          <a:lstStyle/>
+          <a:p>
+            <a:r>
+              <a:rPr lang="fr-FR" dirty="0" smtClean="0"/>
               <a:t>Dîner des philosophes</a:t>
             </a:r>
             <a:endParaRPr lang="fr-FR" dirty="0"/>
@@ -3800,14 +5031,14 @@
   <p:timing>
     <p:tnLst>
       <p:par>
-        <p:cTn id="1" dur="indefinite" restart="never" nodeType="tmRoot"/>
+        <p:cTn xmlns:p14="http://schemas.microsoft.com/office/powerpoint/2010/main" id="1" dur="indefinite" restart="never" nodeType="tmRoot"/>
       </p:par>
     </p:tnLst>
   </p:timing>
 </p:sld>
 </file>
 
-<file path=ppt/slides/slide3.xml><?xml version="1.0" encoding="utf-8"?>
+<file path=ppt/slides/slide6.xml><?xml version="1.0" encoding="utf-8"?>
 <p:sld xmlns:a="http://schemas.openxmlformats.org/drawingml/2006/main" xmlns:r="http://schemas.openxmlformats.org/officeDocument/2006/relationships" xmlns:p="http://schemas.openxmlformats.org/presentationml/2006/main">
   <p:cSld>
     <p:spTree>
@@ -3855,7 +5086,7 @@
           </a:prstGeom>
           <a:noFill/>
           <a:extLst>
-            <a:ext uri="{909E8E84-426E-40DD-AFC4-6F175D3DCCD1}">
+            <a:ext uri="{909E8E84-426E-40dd-AFC4-6F175D3DCCD1}">
               <a14:hiddenFill xmlns:a14="http://schemas.microsoft.com/office/drawing/2010/main">
                 <a:solidFill>
                   <a:srgbClr val="FFFFFF"/>
@@ -3942,7 +5173,7 @@
           </a:prstGeom>
           <a:noFill/>
           <a:extLst>
-            <a:ext uri="{909E8E84-426E-40DD-AFC4-6F175D3DCCD1}">
+            <a:ext uri="{909E8E84-426E-40dd-AFC4-6F175D3DCCD1}">
               <a14:hiddenFill xmlns:a14="http://schemas.microsoft.com/office/drawing/2010/main">
                 <a:solidFill>
                   <a:srgbClr val="FFFFFF"/>
@@ -3983,7 +5214,7 @@
           </a:prstGeom>
           <a:noFill/>
           <a:extLst>
-            <a:ext uri="{909E8E84-426E-40DD-AFC4-6F175D3DCCD1}">
+            <a:ext uri="{909E8E84-426E-40dd-AFC4-6F175D3DCCD1}">
               <a14:hiddenFill xmlns:a14="http://schemas.microsoft.com/office/drawing/2010/main">
                 <a:solidFill>
                   <a:srgbClr val="FFFFFF"/>
@@ -4024,7 +5255,7 @@
           </a:prstGeom>
           <a:noFill/>
           <a:extLst>
-            <a:ext uri="{909E8E84-426E-40DD-AFC4-6F175D3DCCD1}">
+            <a:ext uri="{909E8E84-426E-40dd-AFC4-6F175D3DCCD1}">
               <a14:hiddenFill xmlns:a14="http://schemas.microsoft.com/office/drawing/2010/main">
                 <a:solidFill>
                   <a:srgbClr val="FFFFFF"/>
@@ -4065,7 +5296,7 @@
           </a:prstGeom>
           <a:noFill/>
           <a:extLst>
-            <a:ext uri="{909E8E84-426E-40DD-AFC4-6F175D3DCCD1}">
+            <a:ext uri="{909E8E84-426E-40dd-AFC4-6F175D3DCCD1}">
               <a14:hiddenFill xmlns:a14="http://schemas.microsoft.com/office/drawing/2010/main">
                 <a:solidFill>
                   <a:srgbClr val="FFFFFF"/>
@@ -4106,7 +5337,7 @@
           </a:prstGeom>
           <a:noFill/>
           <a:extLst>
-            <a:ext uri="{909E8E84-426E-40DD-AFC4-6F175D3DCCD1}">
+            <a:ext uri="{909E8E84-426E-40dd-AFC4-6F175D3DCCD1}">
               <a14:hiddenFill xmlns:a14="http://schemas.microsoft.com/office/drawing/2010/main">
                 <a:solidFill>
                   <a:srgbClr val="FFFFFF"/>
@@ -4436,7 +5667,7 @@
   <p:timing>
     <p:tnLst>
       <p:par>
-        <p:cTn id="1" dur="indefinite" restart="never" nodeType="tmRoot">
+        <p:cTn xmlns:p14="http://schemas.microsoft.com/office/powerpoint/2010/main" id="1" dur="indefinite" restart="never" nodeType="tmRoot">
           <p:childTnLst>
             <p:seq concurrent="1" nextAc="seek">
               <p:cTn id="2" dur="indefinite" nodeType="mainSeq">

</xml_diff>